<commit_message>
updated slides on orientdb
</commit_message>
<xml_diff>
--- a/presentations/2_OrientDB.pptx
+++ b/presentations/2_OrientDB.pptx
@@ -513,7 +513,7 @@
             <a:fld id="{57619A7C-C3A7-417A-BED5-3A0CF20BE46F}" type="datetimeFigureOut">
               <a:rPr lang="en-US" smtClean="0"/>
               <a:pPr/>
-              <a:t>2/28/2016</a:t>
+              <a:t>3/1/2016</a:t>
             </a:fld>
             <a:endParaRPr lang="en-US"/>
           </a:p>
@@ -8012,7 +8012,11 @@
             </a:pPr>
             <a:r>
               <a:rPr lang="en-IN" dirty="0" smtClean="0"/>
-              <a:t>Collection of Key / Value pairs referred as fields or properties</a:t>
+              <a:t>Document is a Collection </a:t>
+            </a:r>
+            <a:r>
+              <a:rPr lang="en-IN" dirty="0" smtClean="0"/>
+              <a:t>of Key / Value pairs referred as fields or properties</a:t>
             </a:r>
           </a:p>
           <a:p>
@@ -8457,6 +8461,13 @@
     <a:masterClrMapping/>
   </p:clrMapOvr>
   <p:transition/>
+  <p:timing>
+    <p:tnLst>
+      <p:par>
+        <p:cTn id="1" dur="indefinite" restart="never" nodeType="tmRoot"/>
+      </p:par>
+    </p:tnLst>
+  </p:timing>
 </p:sld>
 </file>
 
@@ -8548,6 +8559,13 @@
     <a:masterClrMapping/>
   </p:clrMapOvr>
   <p:transition/>
+  <p:timing>
+    <p:tnLst>
+      <p:par>
+        <p:cTn id="1" dur="indefinite" restart="never" nodeType="tmRoot"/>
+      </p:par>
+    </p:tnLst>
+  </p:timing>
 </p:sld>
 </file>
 
@@ -9193,6 +9211,13 @@
     <a:masterClrMapping/>
   </p:clrMapOvr>
   <p:transition/>
+  <p:timing>
+    <p:tnLst>
+      <p:par>
+        <p:cTn id="1" dur="indefinite" restart="never" nodeType="tmRoot"/>
+      </p:par>
+    </p:tnLst>
+  </p:timing>
 </p:sld>
 </file>
 
@@ -9284,6 +9309,13 @@
     <a:masterClrMapping/>
   </p:clrMapOvr>
   <p:transition/>
+  <p:timing>
+    <p:tnLst>
+      <p:par>
+        <p:cTn id="1" dur="indefinite" restart="never" nodeType="tmRoot"/>
+      </p:par>
+    </p:tnLst>
+  </p:timing>
 </p:sld>
 </file>
 
@@ -9617,6 +9649,13 @@
     <a:masterClrMapping/>
   </p:clrMapOvr>
   <p:transition/>
+  <p:timing>
+    <p:tnLst>
+      <p:par>
+        <p:cTn id="1" dur="indefinite" restart="never" nodeType="tmRoot"/>
+      </p:par>
+    </p:tnLst>
+  </p:timing>
 </p:sld>
 </file>
 
@@ -9708,6 +9747,13 @@
     <a:masterClrMapping/>
   </p:clrMapOvr>
   <p:transition/>
+  <p:timing>
+    <p:tnLst>
+      <p:par>
+        <p:cTn id="1" dur="indefinite" restart="never" nodeType="tmRoot"/>
+      </p:par>
+    </p:tnLst>
+  </p:timing>
 </p:sld>
 </file>
 
@@ -9955,6 +10001,13 @@
     <a:masterClrMapping/>
   </p:clrMapOvr>
   <p:transition/>
+  <p:timing>
+    <p:tnLst>
+      <p:par>
+        <p:cTn id="1" dur="indefinite" restart="never" nodeType="tmRoot"/>
+      </p:par>
+    </p:tnLst>
+  </p:timing>
 </p:sld>
 </file>
 
@@ -10094,6 +10147,13 @@
     <a:masterClrMapping/>
   </p:clrMapOvr>
   <p:transition/>
+  <p:timing>
+    <p:tnLst>
+      <p:par>
+        <p:cTn id="1" dur="indefinite" restart="never" nodeType="tmRoot"/>
+      </p:par>
+    </p:tnLst>
+  </p:timing>
 </p:sld>
 </file>
 
@@ -10192,6 +10252,13 @@
     <a:masterClrMapping/>
   </p:clrMapOvr>
   <p:transition/>
+  <p:timing>
+    <p:tnLst>
+      <p:par>
+        <p:cTn id="1" dur="indefinite" restart="never" nodeType="tmRoot"/>
+      </p:par>
+    </p:tnLst>
+  </p:timing>
 </p:sld>
 </file>
 
@@ -10337,6 +10404,13 @@
     <a:masterClrMapping/>
   </p:clrMapOvr>
   <p:transition/>
+  <p:timing>
+    <p:tnLst>
+      <p:par>
+        <p:cTn id="1" dur="indefinite" restart="never" nodeType="tmRoot"/>
+      </p:par>
+    </p:tnLst>
+  </p:timing>
 </p:sld>
 </file>
 
@@ -10452,6 +10526,13 @@
     <a:masterClrMapping/>
   </p:clrMapOvr>
   <p:transition/>
+  <p:timing>
+    <p:tnLst>
+      <p:par>
+        <p:cTn id="1" dur="indefinite" restart="never" nodeType="tmRoot"/>
+      </p:par>
+    </p:tnLst>
+  </p:timing>
 </p:sld>
 </file>
 
@@ -12301,6 +12382,13 @@
     <a:masterClrMapping/>
   </p:clrMapOvr>
   <p:transition/>
+  <p:timing>
+    <p:tnLst>
+      <p:par>
+        <p:cTn id="1" dur="indefinite" restart="never" nodeType="tmRoot"/>
+      </p:par>
+    </p:tnLst>
+  </p:timing>
 </p:sld>
 </file>
 
@@ -12819,6 +12907,13 @@
     <a:masterClrMapping/>
   </p:clrMapOvr>
   <p:transition/>
+  <p:timing>
+    <p:tnLst>
+      <p:par>
+        <p:cTn id="1" dur="indefinite" restart="never" nodeType="tmRoot"/>
+      </p:par>
+    </p:tnLst>
+  </p:timing>
 </p:sld>
 </file>
 
@@ -12974,6 +13069,13 @@
     <a:masterClrMapping/>
   </p:clrMapOvr>
   <p:transition/>
+  <p:timing>
+    <p:tnLst>
+      <p:par>
+        <p:cTn id="1" dur="indefinite" restart="never" nodeType="tmRoot"/>
+      </p:par>
+    </p:tnLst>
+  </p:timing>
 </p:sld>
 </file>
 
@@ -13619,6 +13721,13 @@
     <a:masterClrMapping/>
   </p:clrMapOvr>
   <p:transition/>
+  <p:timing>
+    <p:tnLst>
+      <p:par>
+        <p:cTn id="1" dur="indefinite" restart="never" nodeType="tmRoot"/>
+      </p:par>
+    </p:tnLst>
+  </p:timing>
 </p:sld>
 </file>
 
@@ -13756,6 +13865,13 @@
     <a:masterClrMapping/>
   </p:clrMapOvr>
   <p:transition/>
+  <p:timing>
+    <p:tnLst>
+      <p:par>
+        <p:cTn id="1" dur="indefinite" restart="never" nodeType="tmRoot"/>
+      </p:par>
+    </p:tnLst>
+  </p:timing>
 </p:sld>
 </file>
 
@@ -14321,7 +14437,6 @@
               <a:rPr lang="en-IN" dirty="0" smtClean="0"/>
               <a:t>Record types</a:t>
             </a:r>
-            <a:endParaRPr lang="en-IN" dirty="0" smtClean="0"/>
           </a:p>
           <a:p>
             <a:pPr lvl="1"/>
@@ -14354,7 +14469,6 @@
               <a:rPr lang="en-IN" dirty="0" smtClean="0"/>
               <a:t>Edges</a:t>
             </a:r>
-            <a:endParaRPr lang="en-IN" dirty="0" smtClean="0"/>
           </a:p>
           <a:p>
             <a:endParaRPr lang="en-IN" dirty="0" smtClean="0"/>
@@ -14498,7 +14612,6 @@
               <a:rPr lang="en-IN" dirty="0" smtClean="0"/>
               <a:t>Also use in schema-less mode (without schema class =&gt; thereby no constrains)</a:t>
             </a:r>
-            <a:endParaRPr lang="en-IN" dirty="0" smtClean="0"/>
           </a:p>
           <a:p>
             <a:endParaRPr lang="en-IN" dirty="0" smtClean="0"/>
@@ -15208,7 +15321,7 @@
               </a:tabLst>
             </a:pPr>
             <a:r>
-              <a:rPr lang="en-IN" sz="1600" dirty="0">
+              <a:rPr lang="en-IN" sz="1600">
                 <a:solidFill>
                   <a:prstClr val="black"/>
                 </a:solidFill>
@@ -15218,6 +15331,26 @@
               <a:t>b</a:t>
             </a:r>
             <a:r>
+              <a:rPr lang="en-IN" sz="1600" smtClean="0">
+                <a:solidFill>
+                  <a:prstClr val="black"/>
+                </a:solidFill>
+                <a:latin typeface="Courier New" panose="02070309020205020404" pitchFamily="49" charset="0"/>
+                <a:cs typeface="Courier New" panose="02070309020205020404" pitchFamily="49" charset="0"/>
+              </a:rPr>
+              <a:t>rowse </a:t>
+            </a:r>
+            <a:r>
+              <a:rPr lang="en-IN" sz="1600" smtClean="0">
+                <a:solidFill>
+                  <a:prstClr val="black"/>
+                </a:solidFill>
+                <a:latin typeface="Courier New" panose="02070309020205020404" pitchFamily="49" charset="0"/>
+                <a:cs typeface="Courier New" panose="02070309020205020404" pitchFamily="49" charset="0"/>
+              </a:rPr>
+              <a:t>class Student</a:t>
+            </a:r>
+            <a:r>
               <a:rPr lang="en-IN" sz="1600" dirty="0" smtClean="0">
                 <a:solidFill>
                   <a:prstClr val="black"/>
@@ -15225,7 +15358,7 @@
                 <a:latin typeface="Courier New" panose="02070309020205020404" pitchFamily="49" charset="0"/>
                 <a:cs typeface="Courier New" panose="02070309020205020404" pitchFamily="49" charset="0"/>
               </a:rPr>
-              <a:t>rowse Student;</a:t>
+              <a:t>;</a:t>
             </a:r>
             <a:endParaRPr lang="en-IN" sz="1600" dirty="0">
               <a:solidFill>
@@ -17382,11 +17515,7 @@
             </a:pPr>
             <a:r>
               <a:rPr lang="en-US" sz="1600" dirty="0" smtClean="0"/>
-              <a:t>Every change to record increases the </a:t>
-            </a:r>
-            <a:r>
-              <a:rPr lang="en-US" sz="1600" dirty="0" smtClean="0"/>
-              <a:t>version</a:t>
+              <a:t>Every change to record increases the version</a:t>
             </a:r>
           </a:p>
           <a:p>
@@ -21206,6 +21335,13 @@
     <a:masterClrMapping/>
   </p:clrMapOvr>
   <p:transition/>
+  <p:timing>
+    <p:tnLst>
+      <p:par>
+        <p:cTn id="1" dur="indefinite" restart="never" nodeType="tmRoot"/>
+      </p:par>
+    </p:tnLst>
+  </p:timing>
 </p:sld>
 </file>
 
@@ -21713,6 +21849,13 @@
     <a:masterClrMapping/>
   </p:clrMapOvr>
   <p:transition/>
+  <p:timing>
+    <p:tnLst>
+      <p:par>
+        <p:cTn id="1" dur="indefinite" restart="never" nodeType="tmRoot"/>
+      </p:par>
+    </p:tnLst>
+  </p:timing>
 </p:sld>
 </file>
 
@@ -21808,6 +21951,13 @@
     <a:masterClrMapping/>
   </p:clrMapOvr>
   <p:transition/>
+  <p:timing>
+    <p:tnLst>
+      <p:par>
+        <p:cTn id="1" dur="indefinite" restart="never" nodeType="tmRoot"/>
+      </p:par>
+    </p:tnLst>
+  </p:timing>
 </p:sld>
 </file>
 
@@ -21899,6 +22049,13 @@
     <a:masterClrMapping/>
   </p:clrMapOvr>
   <p:transition/>
+  <p:timing>
+    <p:tnLst>
+      <p:par>
+        <p:cTn id="1" dur="indefinite" restart="never" nodeType="tmRoot"/>
+      </p:par>
+    </p:tnLst>
+  </p:timing>
 </p:sld>
 </file>
 

</xml_diff>